<commit_message>
PP für Mittwoch 30.11.2022 geändert
</commit_message>
<xml_diff>
--- a/praesentationen/Woche1_Ergebnisse.pptx
+++ b/praesentationen/Woche1_Ergebnisse.pptx
@@ -14,6 +14,9 @@
     <p:sldId id="261" r:id="rId11"/>
     <p:sldId id="262" r:id="rId12"/>
     <p:sldId id="264" r:id="rId13"/>
+    <p:sldId id="266" r:id="rId14"/>
+    <p:sldId id="267" r:id="rId15"/>
+    <p:sldId id="265" r:id="rId16"/>
   </p:sldIdLst>
   <p:sldSz cx="12192000" cy="6858000"/>
   <p:notesSz cx="6858000" cy="9144000"/>
@@ -7336,7 +7339,7 @@
           <a:p>
             <a:fld id="{28556023-671E-42BF-A541-C4F920681D33}" type="datetimeFigureOut">
               <a:rPr lang="de-DE" smtClean="0"/>
-              <a:t>28.10.2022</a:t>
+              <a:t>30.11.2022</a:t>
             </a:fld>
             <a:endParaRPr lang="de-DE"/>
           </a:p>
@@ -7534,7 +7537,7 @@
           <a:p>
             <a:fld id="{28556023-671E-42BF-A541-C4F920681D33}" type="datetimeFigureOut">
               <a:rPr lang="de-DE" smtClean="0"/>
-              <a:t>28.10.2022</a:t>
+              <a:t>30.11.2022</a:t>
             </a:fld>
             <a:endParaRPr lang="de-DE"/>
           </a:p>
@@ -7742,7 +7745,7 @@
           <a:p>
             <a:fld id="{28556023-671E-42BF-A541-C4F920681D33}" type="datetimeFigureOut">
               <a:rPr lang="de-DE" smtClean="0"/>
-              <a:t>28.10.2022</a:t>
+              <a:t>30.11.2022</a:t>
             </a:fld>
             <a:endParaRPr lang="de-DE"/>
           </a:p>
@@ -7940,7 +7943,7 @@
           <a:p>
             <a:fld id="{28556023-671E-42BF-A541-C4F920681D33}" type="datetimeFigureOut">
               <a:rPr lang="de-DE" smtClean="0"/>
-              <a:t>28.10.2022</a:t>
+              <a:t>30.11.2022</a:t>
             </a:fld>
             <a:endParaRPr lang="de-DE"/>
           </a:p>
@@ -8215,7 +8218,7 @@
           <a:p>
             <a:fld id="{28556023-671E-42BF-A541-C4F920681D33}" type="datetimeFigureOut">
               <a:rPr lang="de-DE" smtClean="0"/>
-              <a:t>28.10.2022</a:t>
+              <a:t>30.11.2022</a:t>
             </a:fld>
             <a:endParaRPr lang="de-DE"/>
           </a:p>
@@ -8480,7 +8483,7 @@
           <a:p>
             <a:fld id="{28556023-671E-42BF-A541-C4F920681D33}" type="datetimeFigureOut">
               <a:rPr lang="de-DE" smtClean="0"/>
-              <a:t>28.10.2022</a:t>
+              <a:t>30.11.2022</a:t>
             </a:fld>
             <a:endParaRPr lang="de-DE"/>
           </a:p>
@@ -8892,7 +8895,7 @@
           <a:p>
             <a:fld id="{28556023-671E-42BF-A541-C4F920681D33}" type="datetimeFigureOut">
               <a:rPr lang="de-DE" smtClean="0"/>
-              <a:t>28.10.2022</a:t>
+              <a:t>30.11.2022</a:t>
             </a:fld>
             <a:endParaRPr lang="de-DE"/>
           </a:p>
@@ -9033,7 +9036,7 @@
           <a:p>
             <a:fld id="{28556023-671E-42BF-A541-C4F920681D33}" type="datetimeFigureOut">
               <a:rPr lang="de-DE" smtClean="0"/>
-              <a:t>28.10.2022</a:t>
+              <a:t>30.11.2022</a:t>
             </a:fld>
             <a:endParaRPr lang="de-DE"/>
           </a:p>
@@ -9146,7 +9149,7 @@
           <a:p>
             <a:fld id="{28556023-671E-42BF-A541-C4F920681D33}" type="datetimeFigureOut">
               <a:rPr lang="de-DE" smtClean="0"/>
-              <a:t>28.10.2022</a:t>
+              <a:t>30.11.2022</a:t>
             </a:fld>
             <a:endParaRPr lang="de-DE"/>
           </a:p>
@@ -9457,7 +9460,7 @@
           <a:p>
             <a:fld id="{28556023-671E-42BF-A541-C4F920681D33}" type="datetimeFigureOut">
               <a:rPr lang="de-DE" smtClean="0"/>
-              <a:t>28.10.2022</a:t>
+              <a:t>30.11.2022</a:t>
             </a:fld>
             <a:endParaRPr lang="de-DE"/>
           </a:p>
@@ -9745,7 +9748,7 @@
           <a:p>
             <a:fld id="{28556023-671E-42BF-A541-C4F920681D33}" type="datetimeFigureOut">
               <a:rPr lang="de-DE" smtClean="0"/>
-              <a:t>28.10.2022</a:t>
+              <a:t>30.11.2022</a:t>
             </a:fld>
             <a:endParaRPr lang="de-DE"/>
           </a:p>
@@ -9986,7 +9989,7 @@
           <a:p>
             <a:fld id="{28556023-671E-42BF-A541-C4F920681D33}" type="datetimeFigureOut">
               <a:rPr lang="de-DE" smtClean="0"/>
-              <a:t>28.10.2022</a:t>
+              <a:t>30.11.2022</a:t>
             </a:fld>
             <a:endParaRPr lang="de-DE"/>
           </a:p>
@@ -10538,6 +10541,466 @@
 </p:sld>
 </file>
 
+<file path=ppt/slides/slide10.xml><?xml version="1.0" encoding="utf-8"?>
+<p:sld xmlns:a="http://schemas.openxmlformats.org/drawingml/2006/main" xmlns:r="http://schemas.openxmlformats.org/officeDocument/2006/relationships" xmlns:p="http://schemas.openxmlformats.org/presentationml/2006/main">
+  <p:cSld>
+    <p:spTree>
+      <p:nvGrpSpPr>
+        <p:cNvPr id="1" name=""/>
+        <p:cNvGrpSpPr/>
+        <p:nvPr/>
+      </p:nvGrpSpPr>
+      <p:grpSpPr>
+        <a:xfrm>
+          <a:off x="0" y="0"/>
+          <a:ext cx="0" cy="0"/>
+          <a:chOff x="0" y="0"/>
+          <a:chExt cx="0" cy="0"/>
+        </a:xfrm>
+      </p:grpSpPr>
+      <p:sp>
+        <p:nvSpPr>
+          <p:cNvPr id="3" name="Inhaltsplatzhalter 2">
+            <a:extLst>
+              <a:ext uri="{FF2B5EF4-FFF2-40B4-BE49-F238E27FC236}">
+                <a16:creationId xmlns:a16="http://schemas.microsoft.com/office/drawing/2014/main" id="{223E7ADB-4892-9D40-BC7F-D06E0B8CC549}"/>
+              </a:ext>
+            </a:extLst>
+          </p:cNvPr>
+          <p:cNvSpPr>
+            <a:spLocks noGrp="1"/>
+          </p:cNvSpPr>
+          <p:nvPr>
+            <p:ph idx="1"/>
+          </p:nvPr>
+        </p:nvSpPr>
+        <p:spPr>
+          <a:xfrm>
+            <a:off x="2021305" y="336884"/>
+            <a:ext cx="9332495" cy="6244390"/>
+          </a:xfrm>
+        </p:spPr>
+        <p:txBody>
+          <a:bodyPr>
+            <a:normAutofit lnSpcReduction="10000"/>
+          </a:bodyPr>
+          <a:lstStyle/>
+          <a:p>
+            <a:r>
+              <a:rPr lang="de-DE" dirty="0"/>
+              <a:t>Präsentationsfähigkeit herstellen</a:t>
+            </a:r>
+          </a:p>
+          <a:p>
+            <a:r>
+              <a:rPr lang="de-DE" dirty="0" err="1"/>
+              <a:t>Inference</a:t>
+            </a:r>
+            <a:r>
+              <a:rPr lang="de-DE" dirty="0"/>
+              <a:t> + Skript für Raspberry Pi</a:t>
+            </a:r>
+          </a:p>
+          <a:p>
+            <a:r>
+              <a:rPr lang="de-DE" dirty="0"/>
+              <a:t>Zuverlässiges erkennen der Pakete</a:t>
+            </a:r>
+          </a:p>
+          <a:p>
+            <a:r>
+              <a:rPr lang="de-DE" dirty="0"/>
+              <a:t>Ordnung</a:t>
+            </a:r>
+          </a:p>
+          <a:p>
+            <a:pPr marL="0" indent="0">
+              <a:buNone/>
+            </a:pPr>
+            <a:endParaRPr lang="de-DE" dirty="0"/>
+          </a:p>
+          <a:p>
+            <a:pPr marL="0" indent="0">
+              <a:buNone/>
+            </a:pPr>
+            <a:endParaRPr lang="de-DE" dirty="0"/>
+          </a:p>
+          <a:p>
+            <a:r>
+              <a:rPr lang="de-DE" dirty="0"/>
+              <a:t>Training</a:t>
+            </a:r>
+          </a:p>
+          <a:p>
+            <a:r>
+              <a:rPr lang="de-DE" dirty="0" err="1"/>
+              <a:t>Git</a:t>
+            </a:r>
+            <a:r>
+              <a:rPr lang="de-DE" dirty="0"/>
+              <a:t> aufräumen</a:t>
+            </a:r>
+          </a:p>
+          <a:p>
+            <a:r>
+              <a:rPr lang="de-DE" dirty="0"/>
+              <a:t>Pixel kategorisieren</a:t>
+            </a:r>
+          </a:p>
+          <a:p>
+            <a:r>
+              <a:rPr lang="de-DE" dirty="0"/>
+              <a:t>Gelbe Pixel erkennen</a:t>
+            </a:r>
+          </a:p>
+          <a:p>
+            <a:r>
+              <a:rPr lang="de-DE" dirty="0"/>
+              <a:t>Trainingsdaten sammeln</a:t>
+            </a:r>
+          </a:p>
+          <a:p>
+            <a:r>
+              <a:rPr lang="de-DE" dirty="0"/>
+              <a:t>Mockup</a:t>
+            </a:r>
+          </a:p>
+          <a:p>
+            <a:r>
+              <a:rPr lang="de-DE" dirty="0"/>
+              <a:t>Idee</a:t>
+            </a:r>
+          </a:p>
+        </p:txBody>
+      </p:sp>
+      <p:sp>
+        <p:nvSpPr>
+          <p:cNvPr id="4" name="Rechteck 3">
+            <a:extLst>
+              <a:ext uri="{FF2B5EF4-FFF2-40B4-BE49-F238E27FC236}">
+                <a16:creationId xmlns:a16="http://schemas.microsoft.com/office/drawing/2014/main" id="{B2FCC1C5-FD75-BDBE-2EE0-CE99BF5C5BD9}"/>
+              </a:ext>
+            </a:extLst>
+          </p:cNvPr>
+          <p:cNvSpPr/>
+          <p:nvPr/>
+        </p:nvSpPr>
+        <p:spPr>
+          <a:xfrm rot="16200000">
+            <a:off x="-1935080" y="2921667"/>
+            <a:ext cx="6244391" cy="1074821"/>
+          </a:xfrm>
+          <a:prstGeom prst="rect">
+            <a:avLst/>
+          </a:prstGeom>
+          <a:solidFill>
+            <a:schemeClr val="bg1"/>
+          </a:solidFill>
+          <a:ln w="76200">
+            <a:solidFill>
+              <a:schemeClr val="accent1"/>
+            </a:solidFill>
+          </a:ln>
+        </p:spPr>
+        <p:style>
+          <a:lnRef idx="2">
+            <a:schemeClr val="accent1">
+              <a:shade val="50000"/>
+            </a:schemeClr>
+          </a:lnRef>
+          <a:fillRef idx="1">
+            <a:schemeClr val="accent1"/>
+          </a:fillRef>
+          <a:effectRef idx="0">
+            <a:schemeClr val="accent1"/>
+          </a:effectRef>
+          <a:fontRef idx="minor">
+            <a:schemeClr val="lt1"/>
+          </a:fontRef>
+        </p:style>
+        <p:txBody>
+          <a:bodyPr rtlCol="0" anchor="ctr"/>
+          <a:lstStyle/>
+          <a:p>
+            <a:pPr algn="ctr"/>
+            <a:r>
+              <a:rPr lang="de-DE" sz="3600" dirty="0">
+                <a:solidFill>
+                  <a:schemeClr val="tx1"/>
+                </a:solidFill>
+              </a:rPr>
+              <a:t>Progress</a:t>
+            </a:r>
+          </a:p>
+        </p:txBody>
+      </p:sp>
+      <p:sp>
+        <p:nvSpPr>
+          <p:cNvPr id="5" name="Rechteck 4">
+            <a:extLst>
+              <a:ext uri="{FF2B5EF4-FFF2-40B4-BE49-F238E27FC236}">
+                <a16:creationId xmlns:a16="http://schemas.microsoft.com/office/drawing/2014/main" id="{66DB5165-B59C-8557-000F-34BB2BF0A60C}"/>
+              </a:ext>
+            </a:extLst>
+          </p:cNvPr>
+          <p:cNvSpPr/>
+          <p:nvPr/>
+        </p:nvSpPr>
+        <p:spPr>
+          <a:xfrm>
+            <a:off x="649704" y="2681056"/>
+            <a:ext cx="1074823" cy="3900217"/>
+          </a:xfrm>
+          <a:prstGeom prst="rect">
+            <a:avLst/>
+          </a:prstGeom>
+          <a:solidFill>
+            <a:schemeClr val="accent6">
+              <a:alpha val="32000"/>
+            </a:schemeClr>
+          </a:solidFill>
+        </p:spPr>
+        <p:style>
+          <a:lnRef idx="2">
+            <a:schemeClr val="accent1">
+              <a:shade val="50000"/>
+            </a:schemeClr>
+          </a:lnRef>
+          <a:fillRef idx="1">
+            <a:schemeClr val="accent1"/>
+          </a:fillRef>
+          <a:effectRef idx="0">
+            <a:schemeClr val="accent1"/>
+          </a:effectRef>
+          <a:fontRef idx="minor">
+            <a:schemeClr val="lt1"/>
+          </a:fontRef>
+        </p:style>
+        <p:txBody>
+          <a:bodyPr rtlCol="0" anchor="ctr"/>
+          <a:lstStyle/>
+          <a:p>
+            <a:pPr algn="ctr"/>
+            <a:endParaRPr lang="de-DE"/>
+          </a:p>
+        </p:txBody>
+      </p:sp>
+    </p:spTree>
+    <p:extLst>
+      <p:ext uri="{BB962C8B-B14F-4D97-AF65-F5344CB8AC3E}">
+        <p14:creationId xmlns:p14="http://schemas.microsoft.com/office/powerpoint/2010/main" val="3347798819"/>
+      </p:ext>
+    </p:extLst>
+  </p:cSld>
+  <p:clrMapOvr>
+    <a:masterClrMapping/>
+  </p:clrMapOvr>
+</p:sld>
+</file>
+
+<file path=ppt/slides/slide11.xml><?xml version="1.0" encoding="utf-8"?>
+<p:sld xmlns:a="http://schemas.openxmlformats.org/drawingml/2006/main" xmlns:r="http://schemas.openxmlformats.org/officeDocument/2006/relationships" xmlns:p="http://schemas.openxmlformats.org/presentationml/2006/main">
+  <p:cSld>
+    <p:spTree>
+      <p:nvGrpSpPr>
+        <p:cNvPr id="1" name=""/>
+        <p:cNvGrpSpPr/>
+        <p:nvPr/>
+      </p:nvGrpSpPr>
+      <p:grpSpPr>
+        <a:xfrm>
+          <a:off x="0" y="0"/>
+          <a:ext cx="0" cy="0"/>
+          <a:chOff x="0" y="0"/>
+          <a:chExt cx="0" cy="0"/>
+        </a:xfrm>
+      </p:grpSpPr>
+      <p:sp>
+        <p:nvSpPr>
+          <p:cNvPr id="2" name="Titel 1">
+            <a:extLst>
+              <a:ext uri="{FF2B5EF4-FFF2-40B4-BE49-F238E27FC236}">
+                <a16:creationId xmlns:a16="http://schemas.microsoft.com/office/drawing/2014/main" id="{2593143B-26E9-EE11-8F91-23A64BEAA52E}"/>
+              </a:ext>
+            </a:extLst>
+          </p:cNvPr>
+          <p:cNvSpPr>
+            <a:spLocks noGrp="1"/>
+          </p:cNvSpPr>
+          <p:nvPr>
+            <p:ph type="title"/>
+          </p:nvPr>
+        </p:nvSpPr>
+        <p:spPr/>
+        <p:txBody>
+          <a:bodyPr/>
+          <a:lstStyle/>
+          <a:p>
+            <a:r>
+              <a:rPr lang="de-DE" dirty="0"/>
+              <a:t>Wochenaussicht</a:t>
+            </a:r>
+          </a:p>
+        </p:txBody>
+      </p:sp>
+      <p:sp>
+        <p:nvSpPr>
+          <p:cNvPr id="3" name="Inhaltsplatzhalter 2">
+            <a:extLst>
+              <a:ext uri="{FF2B5EF4-FFF2-40B4-BE49-F238E27FC236}">
+                <a16:creationId xmlns:a16="http://schemas.microsoft.com/office/drawing/2014/main" id="{C9DBBD25-1F69-16DF-A1C4-42243AA40C80}"/>
+              </a:ext>
+            </a:extLst>
+          </p:cNvPr>
+          <p:cNvSpPr>
+            <a:spLocks noGrp="1"/>
+          </p:cNvSpPr>
+          <p:nvPr>
+            <p:ph idx="1"/>
+          </p:nvPr>
+        </p:nvSpPr>
+        <p:spPr/>
+        <p:txBody>
+          <a:bodyPr/>
+          <a:lstStyle/>
+          <a:p>
+            <a:r>
+              <a:rPr lang="de-DE" dirty="0" err="1"/>
+              <a:t>Accuracy</a:t>
+            </a:r>
+            <a:r>
+              <a:rPr lang="de-DE" dirty="0"/>
+              <a:t> gering --&gt; verbessern</a:t>
+            </a:r>
+          </a:p>
+          <a:p>
+            <a:r>
+              <a:rPr lang="de-DE" dirty="0"/>
+              <a:t>Neue/s Feature entwickeln</a:t>
+            </a:r>
+          </a:p>
+          <a:p>
+            <a:endParaRPr lang="de-DE" dirty="0"/>
+          </a:p>
+        </p:txBody>
+      </p:sp>
+    </p:spTree>
+    <p:extLst>
+      <p:ext uri="{BB962C8B-B14F-4D97-AF65-F5344CB8AC3E}">
+        <p14:creationId xmlns:p14="http://schemas.microsoft.com/office/powerpoint/2010/main" val="1797363788"/>
+      </p:ext>
+    </p:extLst>
+  </p:cSld>
+  <p:clrMapOvr>
+    <a:masterClrMapping/>
+  </p:clrMapOvr>
+</p:sld>
+</file>
+
+<file path=ppt/slides/slide12.xml><?xml version="1.0" encoding="utf-8"?>
+<p:sld xmlns:a="http://schemas.openxmlformats.org/drawingml/2006/main" xmlns:r="http://schemas.openxmlformats.org/officeDocument/2006/relationships" xmlns:p="http://schemas.openxmlformats.org/presentationml/2006/main">
+  <p:cSld>
+    <p:spTree>
+      <p:nvGrpSpPr>
+        <p:cNvPr id="1" name=""/>
+        <p:cNvGrpSpPr/>
+        <p:nvPr/>
+      </p:nvGrpSpPr>
+      <p:grpSpPr>
+        <a:xfrm>
+          <a:off x="0" y="0"/>
+          <a:ext cx="0" cy="0"/>
+          <a:chOff x="0" y="0"/>
+          <a:chExt cx="0" cy="0"/>
+        </a:xfrm>
+      </p:grpSpPr>
+      <p:sp>
+        <p:nvSpPr>
+          <p:cNvPr id="2" name="Titel 1">
+            <a:extLst>
+              <a:ext uri="{FF2B5EF4-FFF2-40B4-BE49-F238E27FC236}">
+                <a16:creationId xmlns:a16="http://schemas.microsoft.com/office/drawing/2014/main" id="{75B3EACB-9C8E-1348-8AA1-4E68AD65E679}"/>
+              </a:ext>
+            </a:extLst>
+          </p:cNvPr>
+          <p:cNvSpPr>
+            <a:spLocks noGrp="1"/>
+          </p:cNvSpPr>
+          <p:nvPr>
+            <p:ph type="title"/>
+          </p:nvPr>
+        </p:nvSpPr>
+        <p:spPr/>
+        <p:txBody>
+          <a:bodyPr/>
+          <a:lstStyle/>
+          <a:p>
+            <a:r>
+              <a:rPr lang="de-DE" dirty="0"/>
+              <a:t>Lerneffekte</a:t>
+            </a:r>
+          </a:p>
+        </p:txBody>
+      </p:sp>
+      <p:sp>
+        <p:nvSpPr>
+          <p:cNvPr id="3" name="Inhaltsplatzhalter 2">
+            <a:extLst>
+              <a:ext uri="{FF2B5EF4-FFF2-40B4-BE49-F238E27FC236}">
+                <a16:creationId xmlns:a16="http://schemas.microsoft.com/office/drawing/2014/main" id="{CAC2BCE8-A486-E8F1-D79A-A96ED05354FA}"/>
+              </a:ext>
+            </a:extLst>
+          </p:cNvPr>
+          <p:cNvSpPr>
+            <a:spLocks noGrp="1"/>
+          </p:cNvSpPr>
+          <p:nvPr>
+            <p:ph idx="1"/>
+          </p:nvPr>
+        </p:nvSpPr>
+        <p:spPr/>
+        <p:txBody>
+          <a:bodyPr/>
+          <a:lstStyle/>
+          <a:p>
+            <a:r>
+              <a:rPr lang="de-DE" dirty="0"/>
+              <a:t>HSV-Spektrum </a:t>
+            </a:r>
+          </a:p>
+          <a:p>
+            <a:r>
+              <a:rPr lang="de-DE" dirty="0"/>
+              <a:t>Kompetenz in Python</a:t>
+            </a:r>
+          </a:p>
+          <a:p>
+            <a:r>
+              <a:rPr lang="de-DE" dirty="0"/>
+              <a:t>Neuronales Netz angewendet</a:t>
+            </a:r>
+          </a:p>
+          <a:p>
+            <a:r>
+              <a:rPr lang="de-DE" dirty="0"/>
+              <a:t>Grundverständnis in GitHub</a:t>
+            </a:r>
+          </a:p>
+        </p:txBody>
+      </p:sp>
+    </p:spTree>
+    <p:extLst>
+      <p:ext uri="{BB962C8B-B14F-4D97-AF65-F5344CB8AC3E}">
+        <p14:creationId xmlns:p14="http://schemas.microsoft.com/office/powerpoint/2010/main" val="1138850087"/>
+      </p:ext>
+    </p:extLst>
+  </p:cSld>
+  <p:clrMapOvr>
+    <a:masterClrMapping/>
+  </p:clrMapOvr>
+</p:sld>
+</file>
+
 <file path=ppt/slides/slide2.xml><?xml version="1.0" encoding="utf-8"?>
 <p:sld xmlns:a="http://schemas.openxmlformats.org/drawingml/2006/main" xmlns:r="http://schemas.openxmlformats.org/officeDocument/2006/relationships" xmlns:p="http://schemas.openxmlformats.org/presentationml/2006/main">
   <p:cSld>
@@ -23143,21 +23606,6 @@
 </file>
 
 <file path=customXml/item1.xml><?xml version="1.0" encoding="utf-8"?>
-<p:properties xmlns:p="http://schemas.microsoft.com/office/2006/metadata/properties" xmlns:xsi="http://www.w3.org/2001/XMLSchema-instance" xmlns:pc="http://schemas.microsoft.com/office/infopath/2007/PartnerControls">
-  <documentManagement/>
-</p:properties>
-</file>
-
-<file path=customXml/item2.xml><?xml version="1.0" encoding="utf-8"?>
-<?mso-contentType ?>
-<FormTemplates xmlns="http://schemas.microsoft.com/sharepoint/v3/contenttype/forms">
-  <Display>DocumentLibraryForm</Display>
-  <Edit>DocumentLibraryForm</Edit>
-  <New>DocumentLibraryForm</New>
-</FormTemplates>
-</file>
-
-<file path=customXml/item3.xml><?xml version="1.0" encoding="utf-8"?>
 <ct:contentTypeSchema xmlns:ct="http://schemas.microsoft.com/office/2006/metadata/contentType" xmlns:ma="http://schemas.microsoft.com/office/2006/metadata/properties/metaAttributes" ct:_="" ma:_="" ma:contentTypeName="Dokument" ma:contentTypeID="0x01010013DA34FFD23D724DA6D124D232B0C48B" ma:contentTypeVersion="2" ma:contentTypeDescription="Ein neues Dokument erstellen." ma:contentTypeScope="" ma:versionID="12faabf6fdc06e21e8350a32819c1539">
   <xsd:schema xmlns:xsd="http://www.w3.org/2001/XMLSchema" xmlns:xs="http://www.w3.org/2001/XMLSchema" xmlns:p="http://schemas.microsoft.com/office/2006/metadata/properties" xmlns:ns3="2f08a94a-169f-4fb0-94ff-23a1d20791ce" targetNamespace="http://schemas.microsoft.com/office/2006/metadata/properties" ma:root="true" ma:fieldsID="1b976c1922399edfe6145880681cfb33" ns3:_="">
     <xsd:import namespace="2f08a94a-169f-4fb0-94ff-23a1d20791ce"/>
@@ -23289,31 +23737,22 @@
 </ct:contentTypeSchema>
 </file>
 
+<file path=customXml/item2.xml><?xml version="1.0" encoding="utf-8"?>
+<?mso-contentType ?>
+<FormTemplates xmlns="http://schemas.microsoft.com/sharepoint/v3/contenttype/forms">
+  <Display>DocumentLibraryForm</Display>
+  <Edit>DocumentLibraryForm</Edit>
+  <New>DocumentLibraryForm</New>
+</FormTemplates>
+</file>
+
+<file path=customXml/item3.xml><?xml version="1.0" encoding="utf-8"?>
+<p:properties xmlns:p="http://schemas.microsoft.com/office/2006/metadata/properties" xmlns:xsi="http://www.w3.org/2001/XMLSchema-instance" xmlns:pc="http://schemas.microsoft.com/office/infopath/2007/PartnerControls">
+  <documentManagement/>
+</p:properties>
+</file>
+
 <file path=customXml/itemProps1.xml><?xml version="1.0" encoding="utf-8"?>
-<ds:datastoreItem xmlns:ds="http://schemas.openxmlformats.org/officeDocument/2006/customXml" ds:itemID="{FEEEB3F1-E176-4FC4-9649-E7AA324880EA}">
-  <ds:schemaRefs>
-    <ds:schemaRef ds:uri="http://purl.org/dc/dcmitype/"/>
-    <ds:schemaRef ds:uri="http://purl.org/dc/elements/1.1/"/>
-    <ds:schemaRef ds:uri="http://www.w3.org/XML/1998/namespace"/>
-    <ds:schemaRef ds:uri="2f08a94a-169f-4fb0-94ff-23a1d20791ce"/>
-    <ds:schemaRef ds:uri="http://purl.org/dc/terms/"/>
-    <ds:schemaRef ds:uri="http://schemas.microsoft.com/office/2006/documentManagement/types"/>
-    <ds:schemaRef ds:uri="http://schemas.microsoft.com/office/infopath/2007/PartnerControls"/>
-    <ds:schemaRef ds:uri="http://schemas.openxmlformats.org/package/2006/metadata/core-properties"/>
-    <ds:schemaRef ds:uri="http://schemas.microsoft.com/office/2006/metadata/properties"/>
-  </ds:schemaRefs>
-</ds:datastoreItem>
-</file>
-
-<file path=customXml/itemProps2.xml><?xml version="1.0" encoding="utf-8"?>
-<ds:datastoreItem xmlns:ds="http://schemas.openxmlformats.org/officeDocument/2006/customXml" ds:itemID="{1F8D0725-EF16-4B3D-999D-B89425DB8ECA}">
-  <ds:schemaRefs>
-    <ds:schemaRef ds:uri="http://schemas.microsoft.com/sharepoint/v3/contenttype/forms"/>
-  </ds:schemaRefs>
-</ds:datastoreItem>
-</file>
-
-<file path=customXml/itemProps3.xml><?xml version="1.0" encoding="utf-8"?>
 <ds:datastoreItem xmlns:ds="http://schemas.openxmlformats.org/officeDocument/2006/customXml" ds:itemID="{587EC3BD-8604-4FBC-8E1A-76CDAA3DA85F}">
   <ds:schemaRefs>
     <ds:schemaRef ds:uri="http://schemas.microsoft.com/office/2006/metadata/contentType"/>
@@ -23329,4 +23768,28 @@
     <ds:schemaRef ds:uri="http://schemas.microsoft.com/internal/obd"/>
   </ds:schemaRefs>
 </ds:datastoreItem>
+</file>
+
+<file path=customXml/itemProps2.xml><?xml version="1.0" encoding="utf-8"?>
+<ds:datastoreItem xmlns:ds="http://schemas.openxmlformats.org/officeDocument/2006/customXml" ds:itemID="{1F8D0725-EF16-4B3D-999D-B89425DB8ECA}">
+  <ds:schemaRefs>
+    <ds:schemaRef ds:uri="http://schemas.microsoft.com/sharepoint/v3/contenttype/forms"/>
+  </ds:schemaRefs>
+</ds:datastoreItem>
+</file>
+
+<file path=customXml/itemProps3.xml><?xml version="1.0" encoding="utf-8"?>
+<ds:datastoreItem xmlns:ds="http://schemas.openxmlformats.org/officeDocument/2006/customXml" ds:itemID="{FEEEB3F1-E176-4FC4-9649-E7AA324880EA}">
+  <ds:schemaRefs>
+    <ds:schemaRef ds:uri="http://purl.org/dc/dcmitype/"/>
+    <ds:schemaRef ds:uri="http://purl.org/dc/elements/1.1/"/>
+    <ds:schemaRef ds:uri="http://www.w3.org/XML/1998/namespace"/>
+    <ds:schemaRef ds:uri="2f08a94a-169f-4fb0-94ff-23a1d20791ce"/>
+    <ds:schemaRef ds:uri="http://purl.org/dc/terms/"/>
+    <ds:schemaRef ds:uri="http://schemas.microsoft.com/office/2006/documentManagement/types"/>
+    <ds:schemaRef ds:uri="http://schemas.microsoft.com/office/infopath/2007/PartnerControls"/>
+    <ds:schemaRef ds:uri="http://schemas.openxmlformats.org/package/2006/metadata/core-properties"/>
+    <ds:schemaRef ds:uri="http://schemas.microsoft.com/office/2006/metadata/properties"/>
+  </ds:schemaRefs>
+</ds:datastoreItem>
 </file>
</xml_diff>